<commit_message>
upload lab678 lecture9 comp1
</commit_message>
<xml_diff>
--- a/labs/06_Logistic-Regression_Metrics/06_Logistic-Regression_Metrics_Lab_slide.pptx
+++ b/labs/06_Logistic-Regression_Metrics/06_Logistic-Regression_Metrics_Lab_slide.pptx
@@ -122,6 +122,11 @@
       </a:defRPr>
     </a:lvl9pPr>
   </p:defaultTextStyle>
+  <p:extLst>
+    <p:ext uri="{EFAFB233-063F-42B5-8137-9DF3F51BA10A}">
+      <p15:sldGuideLst xmlns:p15="http://schemas.microsoft.com/office/powerpoint/2012/main"/>
+    </p:ext>
+  </p:extLst>
 </p:presentation>
 </file>
 
@@ -272,7 +277,7 @@
           <a:p>
             <a:fld id="{28BED656-EBC2-48B0-842B-8E34DC6AC464}" type="datetimeFigureOut">
               <a:rPr lang="zh-TW" altLang="en-US" smtClean="0"/>
-              <a:t>2021/10/10</a:t>
+              <a:t>2021/10/13</a:t>
             </a:fld>
             <a:endParaRPr lang="zh-TW" altLang="en-US"/>
           </a:p>
@@ -470,7 +475,7 @@
           <a:p>
             <a:fld id="{28BED656-EBC2-48B0-842B-8E34DC6AC464}" type="datetimeFigureOut">
               <a:rPr lang="zh-TW" altLang="en-US" smtClean="0"/>
-              <a:t>2021/10/10</a:t>
+              <a:t>2021/10/13</a:t>
             </a:fld>
             <a:endParaRPr lang="zh-TW" altLang="en-US"/>
           </a:p>
@@ -678,7 +683,7 @@
           <a:p>
             <a:fld id="{28BED656-EBC2-48B0-842B-8E34DC6AC464}" type="datetimeFigureOut">
               <a:rPr lang="zh-TW" altLang="en-US" smtClean="0"/>
-              <a:t>2021/10/10</a:t>
+              <a:t>2021/10/13</a:t>
             </a:fld>
             <a:endParaRPr lang="zh-TW" altLang="en-US"/>
           </a:p>
@@ -876,7 +881,7 @@
           <a:p>
             <a:fld id="{28BED656-EBC2-48B0-842B-8E34DC6AC464}" type="datetimeFigureOut">
               <a:rPr lang="zh-TW" altLang="en-US" smtClean="0"/>
-              <a:t>2021/10/10</a:t>
+              <a:t>2021/10/13</a:t>
             </a:fld>
             <a:endParaRPr lang="zh-TW" altLang="en-US"/>
           </a:p>
@@ -1151,7 +1156,7 @@
           <a:p>
             <a:fld id="{28BED656-EBC2-48B0-842B-8E34DC6AC464}" type="datetimeFigureOut">
               <a:rPr lang="zh-TW" altLang="en-US" smtClean="0"/>
-              <a:t>2021/10/10</a:t>
+              <a:t>2021/10/13</a:t>
             </a:fld>
             <a:endParaRPr lang="zh-TW" altLang="en-US"/>
           </a:p>
@@ -1416,7 +1421,7 @@
           <a:p>
             <a:fld id="{28BED656-EBC2-48B0-842B-8E34DC6AC464}" type="datetimeFigureOut">
               <a:rPr lang="zh-TW" altLang="en-US" smtClean="0"/>
-              <a:t>2021/10/10</a:t>
+              <a:t>2021/10/13</a:t>
             </a:fld>
             <a:endParaRPr lang="zh-TW" altLang="en-US"/>
           </a:p>
@@ -1828,7 +1833,7 @@
           <a:p>
             <a:fld id="{28BED656-EBC2-48B0-842B-8E34DC6AC464}" type="datetimeFigureOut">
               <a:rPr lang="zh-TW" altLang="en-US" smtClean="0"/>
-              <a:t>2021/10/10</a:t>
+              <a:t>2021/10/13</a:t>
             </a:fld>
             <a:endParaRPr lang="zh-TW" altLang="en-US"/>
           </a:p>
@@ -1969,7 +1974,7 @@
           <a:p>
             <a:fld id="{28BED656-EBC2-48B0-842B-8E34DC6AC464}" type="datetimeFigureOut">
               <a:rPr lang="zh-TW" altLang="en-US" smtClean="0"/>
-              <a:t>2021/10/10</a:t>
+              <a:t>2021/10/13</a:t>
             </a:fld>
             <a:endParaRPr lang="zh-TW" altLang="en-US"/>
           </a:p>
@@ -2082,7 +2087,7 @@
           <a:p>
             <a:fld id="{28BED656-EBC2-48B0-842B-8E34DC6AC464}" type="datetimeFigureOut">
               <a:rPr lang="zh-TW" altLang="en-US" smtClean="0"/>
-              <a:t>2021/10/10</a:t>
+              <a:t>2021/10/13</a:t>
             </a:fld>
             <a:endParaRPr lang="zh-TW" altLang="en-US"/>
           </a:p>
@@ -2393,7 +2398,7 @@
           <a:p>
             <a:fld id="{28BED656-EBC2-48B0-842B-8E34DC6AC464}" type="datetimeFigureOut">
               <a:rPr lang="zh-TW" altLang="en-US" smtClean="0"/>
-              <a:t>2021/10/10</a:t>
+              <a:t>2021/10/13</a:t>
             </a:fld>
             <a:endParaRPr lang="zh-TW" altLang="en-US"/>
           </a:p>
@@ -2681,7 +2686,7 @@
           <a:p>
             <a:fld id="{28BED656-EBC2-48B0-842B-8E34DC6AC464}" type="datetimeFigureOut">
               <a:rPr lang="zh-TW" altLang="en-US" smtClean="0"/>
-              <a:t>2021/10/10</a:t>
+              <a:t>2021/10/13</a:t>
             </a:fld>
             <a:endParaRPr lang="zh-TW" altLang="en-US"/>
           </a:p>
@@ -2922,7 +2927,7 @@
           <a:p>
             <a:fld id="{28BED656-EBC2-48B0-842B-8E34DC6AC464}" type="datetimeFigureOut">
               <a:rPr lang="zh-TW" altLang="en-US" smtClean="0"/>
-              <a:t>2021/10/10</a:t>
+              <a:t>2021/10/13</a:t>
             </a:fld>
             <a:endParaRPr lang="zh-TW" altLang="en-US"/>
           </a:p>
@@ -3872,10 +3877,10 @@
       </p:sp>
       <p:pic>
         <p:nvPicPr>
-          <p:cNvPr id="5" name="圖片 4">
-            <a:extLst>
-              <a:ext uri="{FF2B5EF4-FFF2-40B4-BE49-F238E27FC236}">
-                <a16:creationId xmlns:a16="http://schemas.microsoft.com/office/drawing/2014/main" id="{8568C5B0-4496-448E-B50C-DB37A5CB20D3}"/>
+          <p:cNvPr id="6" name="圖片 5">
+            <a:extLst>
+              <a:ext uri="{FF2B5EF4-FFF2-40B4-BE49-F238E27FC236}">
+                <a16:creationId xmlns:a16="http://schemas.microsoft.com/office/drawing/2014/main" id="{27484D2C-506E-466C-8843-6738F1651BA8}"/>
               </a:ext>
             </a:extLst>
           </p:cNvPr>
@@ -3898,8 +3903,8 @@
         </p:blipFill>
         <p:spPr>
           <a:xfrm>
-            <a:off x="6788250" y="1291431"/>
-            <a:ext cx="4981575" cy="5419725"/>
+            <a:off x="7381875" y="1690688"/>
+            <a:ext cx="3971925" cy="4295775"/>
           </a:xfrm>
           <a:prstGeom prst="rect">
             <a:avLst/>
@@ -6216,8 +6221,8 @@
           </a:p>
         </p:txBody>
       </p:sp>
-      <mc:AlternateContent xmlns:mc="http://schemas.openxmlformats.org/markup-compatibility/2006">
-        <mc:Choice xmlns:a14="http://schemas.microsoft.com/office/drawing/2010/main" Requires="a14">
+      <mc:AlternateContent xmlns:mc="http://schemas.openxmlformats.org/markup-compatibility/2006" xmlns:a14="http://schemas.microsoft.com/office/drawing/2010/main">
+        <mc:Choice Requires="a14">
           <p:sp>
             <p:nvSpPr>
               <p:cNvPr id="3" name="內容版面配置區 2">
@@ -6412,7 +6417,7 @@
             </p:txBody>
           </p:sp>
         </mc:Choice>
-        <mc:Fallback>
+        <mc:Fallback xmlns="">
           <p:sp>
             <p:nvSpPr>
               <p:cNvPr id="3" name="內容版面配置區 2">
@@ -6586,8 +6591,8 @@
           </a:p>
         </p:txBody>
       </p:sp>
-      <mc:AlternateContent xmlns:mc="http://schemas.openxmlformats.org/markup-compatibility/2006">
-        <mc:Choice xmlns:a14="http://schemas.microsoft.com/office/drawing/2010/main" Requires="a14">
+      <mc:AlternateContent xmlns:mc="http://schemas.openxmlformats.org/markup-compatibility/2006" xmlns:a14="http://schemas.microsoft.com/office/drawing/2010/main">
+        <mc:Choice Requires="a14">
           <p:sp>
             <p:nvSpPr>
               <p:cNvPr id="3" name="內容版面配置區 2">
@@ -6618,49 +6623,67 @@
                 <a14:m>
                   <m:oMath xmlns:m="http://schemas.openxmlformats.org/officeDocument/2006/math">
                     <m:r>
-                      <a:rPr lang="en-US" altLang="zh-TW" b="0" i="1" smtClean="0"/>
+                      <a:rPr lang="en-US" altLang="zh-TW" b="0" i="1" smtClean="0">
+                        <a:latin typeface="Cambria Math" panose="02040503050406030204" pitchFamily="18" charset="0"/>
+                      </a:rPr>
                       <m:t>𝑃</m:t>
                     </m:r>
                     <m:d>
                       <m:dPr>
                         <m:ctrlPr>
-                          <a:rPr lang="en-US" altLang="zh-TW" b="0" i="1" smtClean="0"/>
+                          <a:rPr lang="en-US" altLang="zh-TW" b="0" i="1" smtClean="0">
+                            <a:latin typeface="Cambria Math" panose="02040503050406030204" pitchFamily="18" charset="0"/>
+                          </a:rPr>
                         </m:ctrlPr>
                       </m:dPr>
                       <m:e>
                         <m:r>
-                          <a:rPr lang="en-US" altLang="zh-TW" b="0" i="1" smtClean="0"/>
+                          <a:rPr lang="en-US" altLang="zh-TW" b="0" i="1" smtClean="0">
+                            <a:latin typeface="Cambria Math" panose="02040503050406030204" pitchFamily="18" charset="0"/>
+                          </a:rPr>
                           <m:t>𝑥</m:t>
                         </m:r>
                         <m:r>
-                          <a:rPr lang="en-US" altLang="zh-TW" b="0" i="1" smtClean="0"/>
+                          <a:rPr lang="en-US" altLang="zh-TW" b="0" i="1" smtClean="0">
+                            <a:latin typeface="Cambria Math" panose="02040503050406030204" pitchFamily="18" charset="0"/>
+                          </a:rPr>
                           <m:t>=</m:t>
                         </m:r>
                         <m:r>
-                          <a:rPr lang="en-US" altLang="zh-TW" b="0" i="1" smtClean="0"/>
+                          <a:rPr lang="en-US" altLang="zh-TW" b="0" i="1" smtClean="0">
+                            <a:latin typeface="Cambria Math" panose="02040503050406030204" pitchFamily="18" charset="0"/>
+                          </a:rPr>
                           <m:t>h𝑒𝑎𝑑</m:t>
                         </m:r>
                       </m:e>
                     </m:d>
                     <m:r>
-                      <a:rPr lang="en-US" altLang="zh-TW" b="0" i="1" smtClean="0"/>
+                      <a:rPr lang="en-US" altLang="zh-TW" b="0" i="1" smtClean="0">
+                        <a:latin typeface="Cambria Math" panose="02040503050406030204" pitchFamily="18" charset="0"/>
+                      </a:rPr>
                       <m:t>=</m:t>
                     </m:r>
                     <m:f>
                       <m:fPr>
                         <m:ctrlPr>
-                          <a:rPr lang="en-US" altLang="zh-TW" b="0" i="1" smtClean="0"/>
+                          <a:rPr lang="en-US" altLang="zh-TW" b="0" i="1" smtClean="0">
+                            <a:latin typeface="Cambria Math" panose="02040503050406030204" pitchFamily="18" charset="0"/>
+                          </a:rPr>
                         </m:ctrlPr>
                       </m:fPr>
                       <m:num>
                         <m:r>
-                          <a:rPr lang="en-US" altLang="zh-TW" b="0" i="1" smtClean="0"/>
+                          <a:rPr lang="en-US" altLang="zh-TW" b="0" i="1" smtClean="0">
+                            <a:latin typeface="Cambria Math" panose="02040503050406030204" pitchFamily="18" charset="0"/>
+                          </a:rPr>
                           <m:t>1</m:t>
                         </m:r>
                       </m:num>
                       <m:den>
                         <m:r>
-                          <a:rPr lang="en-US" altLang="zh-TW" b="0" i="1" smtClean="0"/>
+                          <a:rPr lang="en-US" altLang="zh-TW" b="0" i="1" smtClean="0">
+                            <a:latin typeface="Cambria Math" panose="02040503050406030204" pitchFamily="18" charset="0"/>
+                          </a:rPr>
                           <m:t>2</m:t>
                         </m:r>
                       </m:den>
@@ -6678,32 +6701,44 @@
                 <a14:m>
                   <m:oMath xmlns:m="http://schemas.openxmlformats.org/officeDocument/2006/math">
                     <m:r>
-                      <a:rPr lang="en-US" altLang="zh-TW" b="0" i="1" smtClean="0"/>
+                      <a:rPr lang="en-US" altLang="zh-TW" b="0" i="1" smtClean="0">
+                        <a:latin typeface="Cambria Math" panose="02040503050406030204" pitchFamily="18" charset="0"/>
+                      </a:rPr>
                       <m:t>𝑃</m:t>
                     </m:r>
                     <m:d>
                       <m:dPr>
                         <m:ctrlPr>
-                          <a:rPr lang="en-US" altLang="zh-TW" b="0" i="1" smtClean="0"/>
+                          <a:rPr lang="en-US" altLang="zh-TW" b="0" i="1" smtClean="0">
+                            <a:latin typeface="Cambria Math" panose="02040503050406030204" pitchFamily="18" charset="0"/>
+                          </a:rPr>
                         </m:ctrlPr>
                       </m:dPr>
                       <m:e>
                         <m:r>
-                          <a:rPr lang="en-US" altLang="zh-TW" b="0" i="1" smtClean="0"/>
+                          <a:rPr lang="en-US" altLang="zh-TW" b="0" i="1" smtClean="0">
+                            <a:latin typeface="Cambria Math" panose="02040503050406030204" pitchFamily="18" charset="0"/>
+                          </a:rPr>
                           <m:t>𝑥</m:t>
                         </m:r>
                         <m:r>
-                          <a:rPr lang="en-US" altLang="zh-TW" b="0" i="1" smtClean="0"/>
+                          <a:rPr lang="en-US" altLang="zh-TW" b="0" i="1" smtClean="0">
+                            <a:latin typeface="Cambria Math" panose="02040503050406030204" pitchFamily="18" charset="0"/>
+                          </a:rPr>
                           <m:t>=</m:t>
                         </m:r>
                         <m:r>
-                          <a:rPr lang="en-US" altLang="zh-TW" b="0" i="1" smtClean="0"/>
+                          <a:rPr lang="en-US" altLang="zh-TW" b="0" i="1" smtClean="0">
+                            <a:latin typeface="Cambria Math" panose="02040503050406030204" pitchFamily="18" charset="0"/>
+                          </a:rPr>
                           <m:t>𝑡𝑎𝑖𝑙</m:t>
                         </m:r>
                       </m:e>
                     </m:d>
                     <m:r>
-                      <a:rPr lang="en-US" altLang="zh-TW" b="0" i="1" smtClean="0"/>
+                      <a:rPr lang="en-US" altLang="zh-TW" b="0" i="1" smtClean="0">
+                        <a:latin typeface="Cambria Math" panose="02040503050406030204" pitchFamily="18" charset="0"/>
+                      </a:rPr>
                       <m:t>=</m:t>
                     </m:r>
                   </m:oMath>
@@ -6717,18 +6752,24 @@
                     <m:f>
                       <m:fPr>
                         <m:ctrlPr>
-                          <a:rPr lang="en-US" altLang="zh-TW" b="0" i="1" smtClean="0"/>
+                          <a:rPr lang="en-US" altLang="zh-TW" b="0" i="1" smtClean="0">
+                            <a:latin typeface="Cambria Math" panose="02040503050406030204" pitchFamily="18" charset="0"/>
+                          </a:rPr>
                         </m:ctrlPr>
                       </m:fPr>
                       <m:num>
                         <m:r>
-                          <a:rPr lang="en-US" altLang="zh-TW" b="0" i="1" smtClean="0"/>
+                          <a:rPr lang="en-US" altLang="zh-TW" b="0" i="1" smtClean="0">
+                            <a:latin typeface="Cambria Math" panose="02040503050406030204" pitchFamily="18" charset="0"/>
+                          </a:rPr>
                           <m:t>1</m:t>
                         </m:r>
                       </m:num>
                       <m:den>
                         <m:r>
-                          <a:rPr lang="en-US" altLang="zh-TW" b="0" i="1" smtClean="0"/>
+                          <a:rPr lang="en-US" altLang="zh-TW" b="0" i="1" smtClean="0">
+                            <a:latin typeface="Cambria Math" panose="02040503050406030204" pitchFamily="18" charset="0"/>
+                          </a:rPr>
                           <m:t>2</m:t>
                         </m:r>
                       </m:den>
@@ -6766,7 +6807,7 @@
             </p:txBody>
           </p:sp>
         </mc:Choice>
-        <mc:Fallback>
+        <mc:Fallback xmlns="">
           <p:sp>
             <p:nvSpPr>
               <p:cNvPr id="3" name="內容版面配置區 2">
@@ -7018,7 +7059,7 @@
                 </a:pPr>
                 <a:r>
                   <a:rPr lang="en-US" altLang="zh-TW" sz="2400" dirty="0"/>
-                  <a:t>If there are 4 patients out of 10 people, the number of Bernoulli trials would be 10, i.e., </a:t>
+                  <a:t>If there are 4 patients out of 10 people, the number of Binomial trials would be 10, i.e., </a:t>
                 </a:r>
                 <a14:m>
                   <m:oMath xmlns:m="http://schemas.openxmlformats.org/officeDocument/2006/math">
@@ -7097,7 +7138,7 @@
               <a:blipFill>
                 <a:blip r:embed="rId2"/>
                 <a:stretch>
-                  <a:fillRect l="-1043" t="-2241" r="-522"/>
+                  <a:fillRect l="-1043" t="-2241" r="-232"/>
                 </a:stretch>
               </a:blipFill>
             </p:spPr>

</xml_diff>